<commit_message>
Class and Dependency diagrams
</commit_message>
<xml_diff>
--- a/Class Diagram.pptx
+++ b/Class Diagram.pptx
@@ -1,19 +1,114 @@
 
 <file path=ppt/presentation.xml><?xml version="1.0" encoding="utf-8"?>
-<p:presentation xmlns:a="http://schemas.openxmlformats.org/drawingml/2006/main" xmlns:p="http://schemas.openxmlformats.org/presentationml/2006/main" xmlns:r="http://schemas.openxmlformats.org/officeDocument/2006/relationships">
+<p:presentation xmlns:a="http://schemas.openxmlformats.org/drawingml/2006/main" xmlns:r="http://schemas.openxmlformats.org/officeDocument/2006/relationships" xmlns:p="http://schemas.openxmlformats.org/presentationml/2006/main">
   <p:sldMasterIdLst>
-    <p:sldMasterId id="2147483648" r:id="rId2"/>
+    <p:sldMasterId id="2147483648" r:id="rId1"/>
   </p:sldMasterIdLst>
   <p:sldIdLst>
-    <p:sldId id="256" r:id="rId3"/>
+    <p:sldId id="256" r:id="rId2"/>
   </p:sldIdLst>
   <p:sldSz cx="10080625" cy="7559675"/>
   <p:notesSz cx="7772400" cy="10058400"/>
+  <p:defaultTextStyle>
+    <a:defPPr>
+      <a:defRPr lang="en-US"/>
+    </a:defPPr>
+    <a:lvl1pPr marL="0" algn="l" defTabSz="914400" rtl="0" eaLnBrk="1" latinLnBrk="0" hangingPunct="1">
+      <a:defRPr sz="1800" kern="1200">
+        <a:solidFill>
+          <a:schemeClr val="tx1"/>
+        </a:solidFill>
+        <a:latin typeface="+mn-lt"/>
+        <a:ea typeface="+mn-ea"/>
+        <a:cs typeface="+mn-cs"/>
+      </a:defRPr>
+    </a:lvl1pPr>
+    <a:lvl2pPr marL="457200" algn="l" defTabSz="914400" rtl="0" eaLnBrk="1" latinLnBrk="0" hangingPunct="1">
+      <a:defRPr sz="1800" kern="1200">
+        <a:solidFill>
+          <a:schemeClr val="tx1"/>
+        </a:solidFill>
+        <a:latin typeface="+mn-lt"/>
+        <a:ea typeface="+mn-ea"/>
+        <a:cs typeface="+mn-cs"/>
+      </a:defRPr>
+    </a:lvl2pPr>
+    <a:lvl3pPr marL="914400" algn="l" defTabSz="914400" rtl="0" eaLnBrk="1" latinLnBrk="0" hangingPunct="1">
+      <a:defRPr sz="1800" kern="1200">
+        <a:solidFill>
+          <a:schemeClr val="tx1"/>
+        </a:solidFill>
+        <a:latin typeface="+mn-lt"/>
+        <a:ea typeface="+mn-ea"/>
+        <a:cs typeface="+mn-cs"/>
+      </a:defRPr>
+    </a:lvl3pPr>
+    <a:lvl4pPr marL="1371600" algn="l" defTabSz="914400" rtl="0" eaLnBrk="1" latinLnBrk="0" hangingPunct="1">
+      <a:defRPr sz="1800" kern="1200">
+        <a:solidFill>
+          <a:schemeClr val="tx1"/>
+        </a:solidFill>
+        <a:latin typeface="+mn-lt"/>
+        <a:ea typeface="+mn-ea"/>
+        <a:cs typeface="+mn-cs"/>
+      </a:defRPr>
+    </a:lvl4pPr>
+    <a:lvl5pPr marL="1828800" algn="l" defTabSz="914400" rtl="0" eaLnBrk="1" latinLnBrk="0" hangingPunct="1">
+      <a:defRPr sz="1800" kern="1200">
+        <a:solidFill>
+          <a:schemeClr val="tx1"/>
+        </a:solidFill>
+        <a:latin typeface="+mn-lt"/>
+        <a:ea typeface="+mn-ea"/>
+        <a:cs typeface="+mn-cs"/>
+      </a:defRPr>
+    </a:lvl5pPr>
+    <a:lvl6pPr marL="2286000" algn="l" defTabSz="914400" rtl="0" eaLnBrk="1" latinLnBrk="0" hangingPunct="1">
+      <a:defRPr sz="1800" kern="1200">
+        <a:solidFill>
+          <a:schemeClr val="tx1"/>
+        </a:solidFill>
+        <a:latin typeface="+mn-lt"/>
+        <a:ea typeface="+mn-ea"/>
+        <a:cs typeface="+mn-cs"/>
+      </a:defRPr>
+    </a:lvl6pPr>
+    <a:lvl7pPr marL="2743200" algn="l" defTabSz="914400" rtl="0" eaLnBrk="1" latinLnBrk="0" hangingPunct="1">
+      <a:defRPr sz="1800" kern="1200">
+        <a:solidFill>
+          <a:schemeClr val="tx1"/>
+        </a:solidFill>
+        <a:latin typeface="+mn-lt"/>
+        <a:ea typeface="+mn-ea"/>
+        <a:cs typeface="+mn-cs"/>
+      </a:defRPr>
+    </a:lvl7pPr>
+    <a:lvl8pPr marL="3200400" algn="l" defTabSz="914400" rtl="0" eaLnBrk="1" latinLnBrk="0" hangingPunct="1">
+      <a:defRPr sz="1800" kern="1200">
+        <a:solidFill>
+          <a:schemeClr val="tx1"/>
+        </a:solidFill>
+        <a:latin typeface="+mn-lt"/>
+        <a:ea typeface="+mn-ea"/>
+        <a:cs typeface="+mn-cs"/>
+      </a:defRPr>
+    </a:lvl8pPr>
+    <a:lvl9pPr marL="3657600" algn="l" defTabSz="914400" rtl="0" eaLnBrk="1" latinLnBrk="0" hangingPunct="1">
+      <a:defRPr sz="1800" kern="1200">
+        <a:solidFill>
+          <a:schemeClr val="tx1"/>
+        </a:solidFill>
+        <a:latin typeface="+mn-lt"/>
+        <a:ea typeface="+mn-ea"/>
+        <a:cs typeface="+mn-cs"/>
+      </a:defRPr>
+    </a:lvl9pPr>
+  </p:defaultTextStyle>
 </p:presentation>
 </file>
 
 <file path=ppt/slideLayouts/slideLayout1.xml><?xml version="1.0" encoding="utf-8"?>
-<p:sldLayout xmlns:a="http://schemas.openxmlformats.org/drawingml/2006/main" xmlns:p="http://schemas.openxmlformats.org/presentationml/2006/main" xmlns:r="http://schemas.openxmlformats.org/officeDocument/2006/relationships" preserve="1" type="blank">
+<p:sldLayout xmlns:a="http://schemas.openxmlformats.org/drawingml/2006/main" xmlns:r="http://schemas.openxmlformats.org/officeDocument/2006/relationships" xmlns:p="http://schemas.openxmlformats.org/presentationml/2006/main" type="blank" preserve="1">
   <p:cSld name="Blank Slide">
     <p:spTree>
       <p:nvGrpSpPr>
@@ -31,11 +126,14 @@
       </p:grpSpPr>
     </p:spTree>
   </p:cSld>
+  <p:clrMapOvr>
+    <a:masterClrMapping/>
+  </p:clrMapOvr>
 </p:sldLayout>
 </file>
 
 <file path=ppt/slideLayouts/slideLayout10.xml><?xml version="1.0" encoding="utf-8"?>
-<p:sldLayout xmlns:a="http://schemas.openxmlformats.org/drawingml/2006/main" xmlns:p="http://schemas.openxmlformats.org/presentationml/2006/main" xmlns:r="http://schemas.openxmlformats.org/officeDocument/2006/relationships" preserve="1" type="objOverTx">
+<p:sldLayout xmlns:a="http://schemas.openxmlformats.org/drawingml/2006/main" xmlns:r="http://schemas.openxmlformats.org/officeDocument/2006/relationships" xmlns:p="http://schemas.openxmlformats.org/presentationml/2006/main" type="objOverTx" preserve="1">
   <p:cSld name="Title, Content over Content">
     <p:spTree>
       <p:nvGrpSpPr>
@@ -71,7 +169,8 @@
           </a:prstGeom>
         </p:spPr>
         <p:txBody>
-          <a:bodyPr anchor="ctr" bIns="0" lIns="0" rIns="0" tIns="0" wrap="none"/>
+          <a:bodyPr wrap="none" lIns="0" tIns="0" rIns="0" bIns="0" anchor="ctr"/>
+          <a:lstStyle/>
           <a:p>
             <a:pPr algn="ctr"/>
             <a:endParaRPr/>
@@ -98,7 +197,8 @@
           </a:prstGeom>
         </p:spPr>
         <p:txBody>
-          <a:bodyPr bIns="0" lIns="0" rIns="0" tIns="0" wrap="none"/>
+          <a:bodyPr wrap="none" lIns="0" tIns="0" rIns="0" bIns="0"/>
+          <a:lstStyle/>
           <a:p>
             <a:endParaRPr/>
           </a:p>
@@ -124,7 +224,8 @@
           </a:prstGeom>
         </p:spPr>
         <p:txBody>
-          <a:bodyPr bIns="0" lIns="0" rIns="0" tIns="0" wrap="none"/>
+          <a:bodyPr wrap="none" lIns="0" tIns="0" rIns="0" bIns="0"/>
+          <a:lstStyle/>
           <a:p>
             <a:endParaRPr/>
           </a:p>
@@ -132,11 +233,14 @@
       </p:sp>
     </p:spTree>
   </p:cSld>
+  <p:clrMapOvr>
+    <a:masterClrMapping/>
+  </p:clrMapOvr>
 </p:sldLayout>
 </file>
 
 <file path=ppt/slideLayouts/slideLayout11.xml><?xml version="1.0" encoding="utf-8"?>
-<p:sldLayout xmlns:a="http://schemas.openxmlformats.org/drawingml/2006/main" xmlns:p="http://schemas.openxmlformats.org/presentationml/2006/main" xmlns:r="http://schemas.openxmlformats.org/officeDocument/2006/relationships" preserve="1" type="fourObj">
+<p:sldLayout xmlns:a="http://schemas.openxmlformats.org/drawingml/2006/main" xmlns:r="http://schemas.openxmlformats.org/officeDocument/2006/relationships" xmlns:p="http://schemas.openxmlformats.org/presentationml/2006/main" type="fourObj" preserve="1">
   <p:cSld name="Title, 4 Content">
     <p:spTree>
       <p:nvGrpSpPr>
@@ -172,7 +276,8 @@
           </a:prstGeom>
         </p:spPr>
         <p:txBody>
-          <a:bodyPr anchor="ctr" bIns="0" lIns="0" rIns="0" tIns="0" wrap="none"/>
+          <a:bodyPr wrap="none" lIns="0" tIns="0" rIns="0" bIns="0" anchor="ctr"/>
+          <a:lstStyle/>
           <a:p>
             <a:pPr algn="ctr"/>
             <a:endParaRPr/>
@@ -199,7 +304,8 @@
           </a:prstGeom>
         </p:spPr>
         <p:txBody>
-          <a:bodyPr bIns="0" lIns="0" rIns="0" tIns="0" wrap="none"/>
+          <a:bodyPr wrap="none" lIns="0" tIns="0" rIns="0" bIns="0"/>
+          <a:lstStyle/>
           <a:p>
             <a:endParaRPr/>
           </a:p>
@@ -225,7 +331,8 @@
           </a:prstGeom>
         </p:spPr>
         <p:txBody>
-          <a:bodyPr bIns="0" lIns="0" rIns="0" tIns="0" wrap="none"/>
+          <a:bodyPr wrap="none" lIns="0" tIns="0" rIns="0" bIns="0"/>
+          <a:lstStyle/>
           <a:p>
             <a:endParaRPr/>
           </a:p>
@@ -251,7 +358,8 @@
           </a:prstGeom>
         </p:spPr>
         <p:txBody>
-          <a:bodyPr bIns="0" lIns="0" rIns="0" tIns="0" wrap="none"/>
+          <a:bodyPr wrap="none" lIns="0" tIns="0" rIns="0" bIns="0"/>
+          <a:lstStyle/>
           <a:p>
             <a:endParaRPr/>
           </a:p>
@@ -277,7 +385,8 @@
           </a:prstGeom>
         </p:spPr>
         <p:txBody>
-          <a:bodyPr bIns="0" lIns="0" rIns="0" tIns="0" wrap="none"/>
+          <a:bodyPr wrap="none" lIns="0" tIns="0" rIns="0" bIns="0"/>
+          <a:lstStyle/>
           <a:p>
             <a:endParaRPr/>
           </a:p>
@@ -285,11 +394,14 @@
       </p:sp>
     </p:spTree>
   </p:cSld>
+  <p:clrMapOvr>
+    <a:masterClrMapping/>
+  </p:clrMapOvr>
 </p:sldLayout>
 </file>
 
 <file path=ppt/slideLayouts/slideLayout12.xml><?xml version="1.0" encoding="utf-8"?>
-<p:sldLayout xmlns:a="http://schemas.openxmlformats.org/drawingml/2006/main" xmlns:p="http://schemas.openxmlformats.org/presentationml/2006/main" xmlns:r="http://schemas.openxmlformats.org/officeDocument/2006/relationships" preserve="1" type="blank">
+<p:sldLayout xmlns:a="http://schemas.openxmlformats.org/drawingml/2006/main" xmlns:r="http://schemas.openxmlformats.org/officeDocument/2006/relationships" xmlns:p="http://schemas.openxmlformats.org/presentationml/2006/main" type="blank" preserve="1">
   <p:cSld name="Title, 6 Content">
     <p:spTree>
       <p:nvGrpSpPr>
@@ -325,7 +437,8 @@
           </a:prstGeom>
         </p:spPr>
         <p:txBody>
-          <a:bodyPr anchor="ctr" bIns="0" lIns="0" rIns="0" tIns="0" wrap="none"/>
+          <a:bodyPr wrap="none" lIns="0" tIns="0" rIns="0" bIns="0" anchor="ctr"/>
+          <a:lstStyle/>
           <a:p>
             <a:pPr algn="ctr"/>
             <a:endParaRPr/>
@@ -352,7 +465,8 @@
           </a:prstGeom>
         </p:spPr>
         <p:txBody>
-          <a:bodyPr bIns="0" lIns="0" rIns="0" tIns="0" wrap="none"/>
+          <a:bodyPr wrap="none" lIns="0" tIns="0" rIns="0" bIns="0"/>
+          <a:lstStyle/>
           <a:p>
             <a:endParaRPr/>
           </a:p>
@@ -378,7 +492,8 @@
           </a:prstGeom>
         </p:spPr>
         <p:txBody>
-          <a:bodyPr bIns="0" lIns="0" rIns="0" tIns="0" wrap="none"/>
+          <a:bodyPr wrap="none" lIns="0" tIns="0" rIns="0" bIns="0"/>
+          <a:lstStyle/>
           <a:p>
             <a:endParaRPr/>
           </a:p>
@@ -386,11 +501,14 @@
       </p:sp>
     </p:spTree>
   </p:cSld>
+  <p:clrMapOvr>
+    <a:masterClrMapping/>
+  </p:clrMapOvr>
 </p:sldLayout>
 </file>
 
 <file path=ppt/slideLayouts/slideLayout2.xml><?xml version="1.0" encoding="utf-8"?>
-<p:sldLayout xmlns:a="http://schemas.openxmlformats.org/drawingml/2006/main" xmlns:p="http://schemas.openxmlformats.org/presentationml/2006/main" xmlns:r="http://schemas.openxmlformats.org/officeDocument/2006/relationships" preserve="1" type="tx">
+<p:sldLayout xmlns:a="http://schemas.openxmlformats.org/drawingml/2006/main" xmlns:r="http://schemas.openxmlformats.org/officeDocument/2006/relationships" xmlns:p="http://schemas.openxmlformats.org/presentationml/2006/main" type="tx" preserve="1">
   <p:cSld name="Title Slide">
     <p:spTree>
       <p:nvGrpSpPr>
@@ -426,7 +544,8 @@
           </a:prstGeom>
         </p:spPr>
         <p:txBody>
-          <a:bodyPr anchor="ctr" bIns="0" lIns="0" rIns="0" tIns="0" wrap="none"/>
+          <a:bodyPr wrap="none" lIns="0" tIns="0" rIns="0" bIns="0" anchor="ctr"/>
+          <a:lstStyle/>
           <a:p>
             <a:pPr algn="ctr"/>
             <a:endParaRPr/>
@@ -453,7 +572,8 @@
           </a:prstGeom>
         </p:spPr>
         <p:txBody>
-          <a:bodyPr anchor="ctr" bIns="0" lIns="0" rIns="0" tIns="0" wrap="none"/>
+          <a:bodyPr wrap="none" lIns="0" tIns="0" rIns="0" bIns="0" anchor="ctr"/>
+          <a:lstStyle/>
           <a:p>
             <a:pPr algn="ctr"/>
             <a:endParaRPr/>
@@ -462,11 +582,14 @@
       </p:sp>
     </p:spTree>
   </p:cSld>
+  <p:clrMapOvr>
+    <a:masterClrMapping/>
+  </p:clrMapOvr>
 </p:sldLayout>
 </file>
 
 <file path=ppt/slideLayouts/slideLayout3.xml><?xml version="1.0" encoding="utf-8"?>
-<p:sldLayout xmlns:a="http://schemas.openxmlformats.org/drawingml/2006/main" xmlns:p="http://schemas.openxmlformats.org/presentationml/2006/main" xmlns:r="http://schemas.openxmlformats.org/officeDocument/2006/relationships" preserve="1" type="obj">
+<p:sldLayout xmlns:a="http://schemas.openxmlformats.org/drawingml/2006/main" xmlns:r="http://schemas.openxmlformats.org/officeDocument/2006/relationships" xmlns:p="http://schemas.openxmlformats.org/presentationml/2006/main" type="obj" preserve="1">
   <p:cSld name="Title, Content">
     <p:spTree>
       <p:nvGrpSpPr>
@@ -502,7 +625,8 @@
           </a:prstGeom>
         </p:spPr>
         <p:txBody>
-          <a:bodyPr anchor="ctr" bIns="0" lIns="0" rIns="0" tIns="0" wrap="none"/>
+          <a:bodyPr wrap="none" lIns="0" tIns="0" rIns="0" bIns="0" anchor="ctr"/>
+          <a:lstStyle/>
           <a:p>
             <a:pPr algn="ctr"/>
             <a:endParaRPr/>
@@ -529,7 +653,8 @@
           </a:prstGeom>
         </p:spPr>
         <p:txBody>
-          <a:bodyPr bIns="0" lIns="0" rIns="0" tIns="0" wrap="none"/>
+          <a:bodyPr wrap="none" lIns="0" tIns="0" rIns="0" bIns="0"/>
+          <a:lstStyle/>
           <a:p>
             <a:endParaRPr/>
           </a:p>
@@ -537,11 +662,14 @@
       </p:sp>
     </p:spTree>
   </p:cSld>
+  <p:clrMapOvr>
+    <a:masterClrMapping/>
+  </p:clrMapOvr>
 </p:sldLayout>
 </file>
 
 <file path=ppt/slideLayouts/slideLayout4.xml><?xml version="1.0" encoding="utf-8"?>
-<p:sldLayout xmlns:a="http://schemas.openxmlformats.org/drawingml/2006/main" xmlns:p="http://schemas.openxmlformats.org/presentationml/2006/main" xmlns:r="http://schemas.openxmlformats.org/officeDocument/2006/relationships" preserve="1" type="twoObj">
+<p:sldLayout xmlns:a="http://schemas.openxmlformats.org/drawingml/2006/main" xmlns:r="http://schemas.openxmlformats.org/officeDocument/2006/relationships" xmlns:p="http://schemas.openxmlformats.org/presentationml/2006/main" type="twoObj" preserve="1">
   <p:cSld name="Title, 2 Content">
     <p:spTree>
       <p:nvGrpSpPr>
@@ -577,7 +705,8 @@
           </a:prstGeom>
         </p:spPr>
         <p:txBody>
-          <a:bodyPr anchor="ctr" bIns="0" lIns="0" rIns="0" tIns="0" wrap="none"/>
+          <a:bodyPr wrap="none" lIns="0" tIns="0" rIns="0" bIns="0" anchor="ctr"/>
+          <a:lstStyle/>
           <a:p>
             <a:pPr algn="ctr"/>
             <a:endParaRPr/>
@@ -604,7 +733,8 @@
           </a:prstGeom>
         </p:spPr>
         <p:txBody>
-          <a:bodyPr bIns="0" lIns="0" rIns="0" tIns="0" wrap="none"/>
+          <a:bodyPr wrap="none" lIns="0" tIns="0" rIns="0" bIns="0"/>
+          <a:lstStyle/>
           <a:p>
             <a:endParaRPr/>
           </a:p>
@@ -630,7 +760,8 @@
           </a:prstGeom>
         </p:spPr>
         <p:txBody>
-          <a:bodyPr bIns="0" lIns="0" rIns="0" tIns="0" wrap="none"/>
+          <a:bodyPr wrap="none" lIns="0" tIns="0" rIns="0" bIns="0"/>
+          <a:lstStyle/>
           <a:p>
             <a:endParaRPr/>
           </a:p>
@@ -638,11 +769,14 @@
       </p:sp>
     </p:spTree>
   </p:cSld>
+  <p:clrMapOvr>
+    <a:masterClrMapping/>
+  </p:clrMapOvr>
 </p:sldLayout>
 </file>
 
 <file path=ppt/slideLayouts/slideLayout5.xml><?xml version="1.0" encoding="utf-8"?>
-<p:sldLayout xmlns:a="http://schemas.openxmlformats.org/drawingml/2006/main" xmlns:p="http://schemas.openxmlformats.org/presentationml/2006/main" xmlns:r="http://schemas.openxmlformats.org/officeDocument/2006/relationships" preserve="1" type="titleOnly">
+<p:sldLayout xmlns:a="http://schemas.openxmlformats.org/drawingml/2006/main" xmlns:r="http://schemas.openxmlformats.org/officeDocument/2006/relationships" xmlns:p="http://schemas.openxmlformats.org/presentationml/2006/main" type="titleOnly" preserve="1">
   <p:cSld name="Title Only">
     <p:spTree>
       <p:nvGrpSpPr>
@@ -678,7 +812,8 @@
           </a:prstGeom>
         </p:spPr>
         <p:txBody>
-          <a:bodyPr anchor="ctr" bIns="0" lIns="0" rIns="0" tIns="0" wrap="none"/>
+          <a:bodyPr wrap="none" lIns="0" tIns="0" rIns="0" bIns="0" anchor="ctr"/>
+          <a:lstStyle/>
           <a:p>
             <a:pPr algn="ctr"/>
             <a:endParaRPr/>
@@ -687,11 +822,14 @@
       </p:sp>
     </p:spTree>
   </p:cSld>
+  <p:clrMapOvr>
+    <a:masterClrMapping/>
+  </p:clrMapOvr>
 </p:sldLayout>
 </file>
 
 <file path=ppt/slideLayouts/slideLayout6.xml><?xml version="1.0" encoding="utf-8"?>
-<p:sldLayout xmlns:a="http://schemas.openxmlformats.org/drawingml/2006/main" xmlns:p="http://schemas.openxmlformats.org/presentationml/2006/main" xmlns:r="http://schemas.openxmlformats.org/officeDocument/2006/relationships" preserve="1" type="objOnly">
+<p:sldLayout xmlns:a="http://schemas.openxmlformats.org/drawingml/2006/main" xmlns:r="http://schemas.openxmlformats.org/officeDocument/2006/relationships" xmlns:p="http://schemas.openxmlformats.org/presentationml/2006/main" type="objOnly" preserve="1">
   <p:cSld name="Centered Text">
     <p:spTree>
       <p:nvGrpSpPr>
@@ -727,7 +865,8 @@
           </a:prstGeom>
         </p:spPr>
         <p:txBody>
-          <a:bodyPr anchor="ctr" bIns="0" lIns="0" rIns="0" tIns="0" wrap="none"/>
+          <a:bodyPr wrap="none" lIns="0" tIns="0" rIns="0" bIns="0" anchor="ctr"/>
+          <a:lstStyle/>
           <a:p>
             <a:pPr algn="ctr"/>
             <a:endParaRPr/>
@@ -736,11 +875,14 @@
       </p:sp>
     </p:spTree>
   </p:cSld>
+  <p:clrMapOvr>
+    <a:masterClrMapping/>
+  </p:clrMapOvr>
 </p:sldLayout>
 </file>
 
 <file path=ppt/slideLayouts/slideLayout7.xml><?xml version="1.0" encoding="utf-8"?>
-<p:sldLayout xmlns:a="http://schemas.openxmlformats.org/drawingml/2006/main" xmlns:p="http://schemas.openxmlformats.org/presentationml/2006/main" xmlns:r="http://schemas.openxmlformats.org/officeDocument/2006/relationships" preserve="1" type="twoObjAndObj">
+<p:sldLayout xmlns:a="http://schemas.openxmlformats.org/drawingml/2006/main" xmlns:r="http://schemas.openxmlformats.org/officeDocument/2006/relationships" xmlns:p="http://schemas.openxmlformats.org/presentationml/2006/main" type="twoObjAndObj" preserve="1">
   <p:cSld name="Title, 2 Content and Content">
     <p:spTree>
       <p:nvGrpSpPr>
@@ -776,7 +918,8 @@
           </a:prstGeom>
         </p:spPr>
         <p:txBody>
-          <a:bodyPr anchor="ctr" bIns="0" lIns="0" rIns="0" tIns="0" wrap="none"/>
+          <a:bodyPr wrap="none" lIns="0" tIns="0" rIns="0" bIns="0" anchor="ctr"/>
+          <a:lstStyle/>
           <a:p>
             <a:pPr algn="ctr"/>
             <a:endParaRPr/>
@@ -803,7 +946,8 @@
           </a:prstGeom>
         </p:spPr>
         <p:txBody>
-          <a:bodyPr bIns="0" lIns="0" rIns="0" tIns="0" wrap="none"/>
+          <a:bodyPr wrap="none" lIns="0" tIns="0" rIns="0" bIns="0"/>
+          <a:lstStyle/>
           <a:p>
             <a:endParaRPr/>
           </a:p>
@@ -829,7 +973,8 @@
           </a:prstGeom>
         </p:spPr>
         <p:txBody>
-          <a:bodyPr bIns="0" lIns="0" rIns="0" tIns="0" wrap="none"/>
+          <a:bodyPr wrap="none" lIns="0" tIns="0" rIns="0" bIns="0"/>
+          <a:lstStyle/>
           <a:p>
             <a:endParaRPr/>
           </a:p>
@@ -855,7 +1000,8 @@
           </a:prstGeom>
         </p:spPr>
         <p:txBody>
-          <a:bodyPr bIns="0" lIns="0" rIns="0" tIns="0" wrap="none"/>
+          <a:bodyPr wrap="none" lIns="0" tIns="0" rIns="0" bIns="0"/>
+          <a:lstStyle/>
           <a:p>
             <a:endParaRPr/>
           </a:p>
@@ -863,11 +1009,14 @@
       </p:sp>
     </p:spTree>
   </p:cSld>
+  <p:clrMapOvr>
+    <a:masterClrMapping/>
+  </p:clrMapOvr>
 </p:sldLayout>
 </file>
 
 <file path=ppt/slideLayouts/slideLayout8.xml><?xml version="1.0" encoding="utf-8"?>
-<p:sldLayout xmlns:a="http://schemas.openxmlformats.org/drawingml/2006/main" xmlns:p="http://schemas.openxmlformats.org/presentationml/2006/main" xmlns:r="http://schemas.openxmlformats.org/officeDocument/2006/relationships" preserve="1" type="objAndTwoObj">
+<p:sldLayout xmlns:a="http://schemas.openxmlformats.org/drawingml/2006/main" xmlns:r="http://schemas.openxmlformats.org/officeDocument/2006/relationships" xmlns:p="http://schemas.openxmlformats.org/presentationml/2006/main" type="objAndTwoObj" preserve="1">
   <p:cSld name="Title Content and 2 Content">
     <p:spTree>
       <p:nvGrpSpPr>
@@ -903,7 +1052,8 @@
           </a:prstGeom>
         </p:spPr>
         <p:txBody>
-          <a:bodyPr anchor="ctr" bIns="0" lIns="0" rIns="0" tIns="0" wrap="none"/>
+          <a:bodyPr wrap="none" lIns="0" tIns="0" rIns="0" bIns="0" anchor="ctr"/>
+          <a:lstStyle/>
           <a:p>
             <a:pPr algn="ctr"/>
             <a:endParaRPr/>
@@ -930,7 +1080,8 @@
           </a:prstGeom>
         </p:spPr>
         <p:txBody>
-          <a:bodyPr bIns="0" lIns="0" rIns="0" tIns="0" wrap="none"/>
+          <a:bodyPr wrap="none" lIns="0" tIns="0" rIns="0" bIns="0"/>
+          <a:lstStyle/>
           <a:p>
             <a:endParaRPr/>
           </a:p>
@@ -956,7 +1107,8 @@
           </a:prstGeom>
         </p:spPr>
         <p:txBody>
-          <a:bodyPr bIns="0" lIns="0" rIns="0" tIns="0" wrap="none"/>
+          <a:bodyPr wrap="none" lIns="0" tIns="0" rIns="0" bIns="0"/>
+          <a:lstStyle/>
           <a:p>
             <a:endParaRPr/>
           </a:p>
@@ -982,7 +1134,8 @@
           </a:prstGeom>
         </p:spPr>
         <p:txBody>
-          <a:bodyPr bIns="0" lIns="0" rIns="0" tIns="0" wrap="none"/>
+          <a:bodyPr wrap="none" lIns="0" tIns="0" rIns="0" bIns="0"/>
+          <a:lstStyle/>
           <a:p>
             <a:endParaRPr/>
           </a:p>
@@ -990,11 +1143,14 @@
       </p:sp>
     </p:spTree>
   </p:cSld>
+  <p:clrMapOvr>
+    <a:masterClrMapping/>
+  </p:clrMapOvr>
 </p:sldLayout>
 </file>
 
 <file path=ppt/slideLayouts/slideLayout9.xml><?xml version="1.0" encoding="utf-8"?>
-<p:sldLayout xmlns:a="http://schemas.openxmlformats.org/drawingml/2006/main" xmlns:p="http://schemas.openxmlformats.org/presentationml/2006/main" xmlns:r="http://schemas.openxmlformats.org/officeDocument/2006/relationships" preserve="1" type="twoObjOverTx">
+<p:sldLayout xmlns:a="http://schemas.openxmlformats.org/drawingml/2006/main" xmlns:r="http://schemas.openxmlformats.org/officeDocument/2006/relationships" xmlns:p="http://schemas.openxmlformats.org/presentationml/2006/main" type="twoObjOverTx" preserve="1">
   <p:cSld name="Title, 2 Content over Content">
     <p:spTree>
       <p:nvGrpSpPr>
@@ -1030,7 +1186,8 @@
           </a:prstGeom>
         </p:spPr>
         <p:txBody>
-          <a:bodyPr anchor="ctr" bIns="0" lIns="0" rIns="0" tIns="0" wrap="none"/>
+          <a:bodyPr wrap="none" lIns="0" tIns="0" rIns="0" bIns="0" anchor="ctr"/>
+          <a:lstStyle/>
           <a:p>
             <a:pPr algn="ctr"/>
             <a:endParaRPr/>
@@ -1057,7 +1214,8 @@
           </a:prstGeom>
         </p:spPr>
         <p:txBody>
-          <a:bodyPr bIns="0" lIns="0" rIns="0" tIns="0" wrap="none"/>
+          <a:bodyPr wrap="none" lIns="0" tIns="0" rIns="0" bIns="0"/>
+          <a:lstStyle/>
           <a:p>
             <a:endParaRPr/>
           </a:p>
@@ -1083,7 +1241,8 @@
           </a:prstGeom>
         </p:spPr>
         <p:txBody>
-          <a:bodyPr bIns="0" lIns="0" rIns="0" tIns="0" wrap="none"/>
+          <a:bodyPr wrap="none" lIns="0" tIns="0" rIns="0" bIns="0"/>
+          <a:lstStyle/>
           <a:p>
             <a:endParaRPr/>
           </a:p>
@@ -1109,7 +1268,8 @@
           </a:prstGeom>
         </p:spPr>
         <p:txBody>
-          <a:bodyPr bIns="0" lIns="0" rIns="0" tIns="0" wrap="none"/>
+          <a:bodyPr wrap="none" lIns="0" tIns="0" rIns="0" bIns="0"/>
+          <a:lstStyle/>
           <a:p>
             <a:endParaRPr/>
           </a:p>
@@ -1117,11 +1277,201 @@
       </p:sp>
     </p:spTree>
   </p:cSld>
+  <p:clrMapOvr>
+    <a:masterClrMapping/>
+  </p:clrMapOvr>
 </p:sldLayout>
 </file>
 
 <file path=ppt/slideMasters/slideMaster1.xml><?xml version="1.0" encoding="utf-8"?>
-<p:sldMaster xmlns:a="http://schemas.openxmlformats.org/drawingml/2006/main" xmlns:p="http://schemas.openxmlformats.org/presentationml/2006/main" xmlns:r="http://schemas.openxmlformats.org/officeDocument/2006/relationships">
+<p:sldMaster xmlns:a="http://schemas.openxmlformats.org/drawingml/2006/main" xmlns:r="http://schemas.openxmlformats.org/officeDocument/2006/relationships" xmlns:p="http://schemas.openxmlformats.org/presentationml/2006/main">
+  <p:cSld>
+    <p:bg>
+      <p:bgRef idx="1001">
+        <a:schemeClr val="bg1"/>
+      </p:bgRef>
+    </p:bg>
+    <p:spTree>
+      <p:nvGrpSpPr>
+        <p:cNvPr id="1" name=""/>
+        <p:cNvGrpSpPr/>
+        <p:nvPr/>
+      </p:nvGrpSpPr>
+      <p:grpSpPr>
+        <a:xfrm>
+          <a:off x="0" y="0"/>
+          <a:ext cx="0" cy="0"/>
+          <a:chOff x="0" y="0"/>
+          <a:chExt cx="0" cy="0"/>
+        </a:xfrm>
+      </p:grpSpPr>
+      <p:sp>
+        <p:nvSpPr>
+          <p:cNvPr id="2" name="PlaceHolder 1"/>
+          <p:cNvSpPr>
+            <a:spLocks noGrp="1"/>
+          </p:cNvSpPr>
+          <p:nvPr>
+            <p:ph type="title"/>
+          </p:nvPr>
+        </p:nvSpPr>
+        <p:spPr>
+          <a:xfrm>
+            <a:off x="504000" y="301320"/>
+            <a:ext cx="9072000" cy="1261800"/>
+          </a:xfrm>
+          <a:prstGeom prst="rect">
+            <a:avLst/>
+          </a:prstGeom>
+        </p:spPr>
+        <p:txBody>
+          <a:bodyPr wrap="none" lIns="0" tIns="0" rIns="0" bIns="0" anchor="ctr"/>
+          <a:lstStyle/>
+          <a:p>
+            <a:pPr algn="ctr"/>
+            <a:r>
+              <a:rPr lang="en-US"/>
+              <a:t>Click to edit the title text format</a:t>
+            </a:r>
+            <a:endParaRPr/>
+          </a:p>
+        </p:txBody>
+      </p:sp>
+      <p:sp>
+        <p:nvSpPr>
+          <p:cNvPr id="3" name="PlaceHolder 2"/>
+          <p:cNvSpPr>
+            <a:spLocks noGrp="1"/>
+          </p:cNvSpPr>
+          <p:nvPr>
+            <p:ph type="body"/>
+          </p:nvPr>
+        </p:nvSpPr>
+        <p:spPr>
+          <a:xfrm>
+            <a:off x="504000" y="1768680"/>
+            <a:ext cx="8870400" cy="4384080"/>
+          </a:xfrm>
+          <a:prstGeom prst="rect">
+            <a:avLst/>
+          </a:prstGeom>
+        </p:spPr>
+        <p:txBody>
+          <a:bodyPr wrap="none" lIns="0" tIns="0" rIns="0" bIns="0"/>
+          <a:lstStyle/>
+          <a:p>
+            <a:pPr>
+              <a:buSzPct val="45000"/>
+              <a:buFont typeface="StarSymbol"/>
+              <a:buChar char=""/>
+            </a:pPr>
+            <a:r>
+              <a:rPr lang="en-US"/>
+              <a:t>Click to edit the outline text format</a:t>
+            </a:r>
+            <a:endParaRPr/>
+          </a:p>
+          <a:p>
+            <a:pPr lvl="1">
+              <a:buSzPct val="75000"/>
+              <a:buFont typeface="StarSymbol"/>
+              <a:buChar char=""/>
+            </a:pPr>
+            <a:r>
+              <a:rPr lang="en-US"/>
+              <a:t>Second Outline Level</a:t>
+            </a:r>
+            <a:endParaRPr/>
+          </a:p>
+          <a:p>
+            <a:pPr lvl="2">
+              <a:buSzPct val="45000"/>
+              <a:buFont typeface="StarSymbol"/>
+              <a:buChar char=""/>
+            </a:pPr>
+            <a:r>
+              <a:rPr lang="en-US"/>
+              <a:t>Third Outline Level</a:t>
+            </a:r>
+            <a:endParaRPr/>
+          </a:p>
+          <a:p>
+            <a:pPr lvl="3">
+              <a:buSzPct val="75000"/>
+              <a:buFont typeface="StarSymbol"/>
+              <a:buChar char=""/>
+            </a:pPr>
+            <a:r>
+              <a:rPr lang="en-US"/>
+              <a:t>Fourth Outline Level</a:t>
+            </a:r>
+            <a:endParaRPr/>
+          </a:p>
+          <a:p>
+            <a:pPr lvl="4">
+              <a:buSzPct val="45000"/>
+              <a:buFont typeface="StarSymbol"/>
+              <a:buChar char=""/>
+            </a:pPr>
+            <a:r>
+              <a:rPr lang="en-US"/>
+              <a:t>Fifth Outline Level</a:t>
+            </a:r>
+            <a:endParaRPr/>
+          </a:p>
+          <a:p>
+            <a:pPr lvl="5">
+              <a:buSzPct val="45000"/>
+              <a:buFont typeface="StarSymbol"/>
+              <a:buChar char=""/>
+            </a:pPr>
+            <a:r>
+              <a:rPr lang="en-US"/>
+              <a:t>Sixth Outline Level</a:t>
+            </a:r>
+            <a:endParaRPr/>
+          </a:p>
+          <a:p>
+            <a:pPr lvl="6">
+              <a:buSzPct val="45000"/>
+              <a:buFont typeface="StarSymbol"/>
+              <a:buChar char=""/>
+            </a:pPr>
+            <a:r>
+              <a:rPr lang="en-US"/>
+              <a:t>Seventh Outline Level</a:t>
+            </a:r>
+            <a:endParaRPr/>
+          </a:p>
+        </p:txBody>
+      </p:sp>
+    </p:spTree>
+  </p:cSld>
+  <p:clrMap bg1="lt1" tx1="dk1" bg2="lt2" tx2="dk2" accent1="accent1" accent2="accent2" accent3="accent3" accent4="accent4" accent5="accent5" accent6="accent6" hlink="hlink" folHlink="folHlink"/>
+  <p:sldLayoutIdLst>
+    <p:sldLayoutId id="2147483649" r:id="rId1"/>
+    <p:sldLayoutId id="2147483650" r:id="rId2"/>
+    <p:sldLayoutId id="2147483651" r:id="rId3"/>
+    <p:sldLayoutId id="2147483652" r:id="rId4"/>
+    <p:sldLayoutId id="2147483653" r:id="rId5"/>
+    <p:sldLayoutId id="2147483654" r:id="rId6"/>
+    <p:sldLayoutId id="2147483655" r:id="rId7"/>
+    <p:sldLayoutId id="2147483656" r:id="rId8"/>
+    <p:sldLayoutId id="2147483657" r:id="rId9"/>
+    <p:sldLayoutId id="2147483658" r:id="rId10"/>
+    <p:sldLayoutId id="2147483659" r:id="rId11"/>
+    <p:sldLayoutId id="2147483660" r:id="rId12"/>
+  </p:sldLayoutIdLst>
+  <p:txStyles>
+    <p:titleStyle/>
+    <p:bodyStyle/>
+    <p:otherStyle/>
+  </p:txStyles>
+</p:sldMaster>
+</file>
+
+<file path=ppt/slides/slide1.xml><?xml version="1.0" encoding="utf-8"?>
+<p:sld xmlns:a="http://schemas.openxmlformats.org/drawingml/2006/main" xmlns:r="http://schemas.openxmlformats.org/officeDocument/2006/relationships" xmlns:p="http://schemas.openxmlformats.org/presentationml/2006/main">
   <p:cSld>
     <p:spTree>
       <p:nvGrpSpPr>
@@ -1139,181 +1489,6 @@
       </p:grpSpPr>
       <p:sp>
         <p:nvSpPr>
-          <p:cNvPr id="0" name="PlaceHolder 1"/>
-          <p:cNvSpPr>
-            <a:spLocks noGrp="1"/>
-          </p:cNvSpPr>
-          <p:nvPr>
-            <p:ph type="title"/>
-          </p:nvPr>
-        </p:nvSpPr>
-        <p:spPr>
-          <a:xfrm>
-            <a:off x="504000" y="301320"/>
-            <a:ext cx="9072000" cy="1261800"/>
-          </a:xfrm>
-          <a:prstGeom prst="rect">
-            <a:avLst/>
-          </a:prstGeom>
-        </p:spPr>
-        <p:txBody>
-          <a:bodyPr anchor="ctr" bIns="0" lIns="0" rIns="0" tIns="0" wrap="none"/>
-          <a:p>
-            <a:pPr algn="ctr"/>
-            <a:r>
-              <a:rPr lang="en-US"/>
-              <a:t>Click to edit the title text format</a:t>
-            </a:r>
-            <a:endParaRPr/>
-          </a:p>
-        </p:txBody>
-      </p:sp>
-      <p:sp>
-        <p:nvSpPr>
-          <p:cNvPr id="1" name="PlaceHolder 2"/>
-          <p:cNvSpPr>
-            <a:spLocks noGrp="1"/>
-          </p:cNvSpPr>
-          <p:nvPr>
-            <p:ph type="body"/>
-          </p:nvPr>
-        </p:nvSpPr>
-        <p:spPr>
-          <a:xfrm>
-            <a:off x="504000" y="1768680"/>
-            <a:ext cx="8870400" cy="4384080"/>
-          </a:xfrm>
-          <a:prstGeom prst="rect">
-            <a:avLst/>
-          </a:prstGeom>
-        </p:spPr>
-        <p:txBody>
-          <a:bodyPr bIns="0" lIns="0" rIns="0" tIns="0" wrap="none"/>
-          <a:p>
-            <a:pPr>
-              <a:buSzPct val="45000"/>
-              <a:buFont typeface="StarSymbol"/>
-              <a:buChar char=""/>
-            </a:pPr>
-            <a:r>
-              <a:rPr lang="en-US"/>
-              <a:t>Click to edit the outline text format</a:t>
-            </a:r>
-            <a:endParaRPr/>
-          </a:p>
-          <a:p>
-            <a:pPr lvl="1">
-              <a:buSzPct val="75000"/>
-              <a:buFont typeface="StarSymbol"/>
-              <a:buChar char=""/>
-            </a:pPr>
-            <a:r>
-              <a:rPr lang="en-US"/>
-              <a:t>Second Outline Level</a:t>
-            </a:r>
-            <a:endParaRPr/>
-          </a:p>
-          <a:p>
-            <a:pPr lvl="2">
-              <a:buSzPct val="45000"/>
-              <a:buFont typeface="StarSymbol"/>
-              <a:buChar char=""/>
-            </a:pPr>
-            <a:r>
-              <a:rPr lang="en-US"/>
-              <a:t>Third Outline Level</a:t>
-            </a:r>
-            <a:endParaRPr/>
-          </a:p>
-          <a:p>
-            <a:pPr lvl="3">
-              <a:buSzPct val="75000"/>
-              <a:buFont typeface="StarSymbol"/>
-              <a:buChar char=""/>
-            </a:pPr>
-            <a:r>
-              <a:rPr lang="en-US"/>
-              <a:t>Fourth Outline Level</a:t>
-            </a:r>
-            <a:endParaRPr/>
-          </a:p>
-          <a:p>
-            <a:pPr lvl="4">
-              <a:buSzPct val="45000"/>
-              <a:buFont typeface="StarSymbol"/>
-              <a:buChar char=""/>
-            </a:pPr>
-            <a:r>
-              <a:rPr lang="en-US"/>
-              <a:t>Fifth Outline Level</a:t>
-            </a:r>
-            <a:endParaRPr/>
-          </a:p>
-          <a:p>
-            <a:pPr lvl="5">
-              <a:buSzPct val="45000"/>
-              <a:buFont typeface="StarSymbol"/>
-              <a:buChar char=""/>
-            </a:pPr>
-            <a:r>
-              <a:rPr lang="en-US"/>
-              <a:t>Sixth Outline Level</a:t>
-            </a:r>
-            <a:endParaRPr/>
-          </a:p>
-          <a:p>
-            <a:pPr lvl="6">
-              <a:buSzPct val="45000"/>
-              <a:buFont typeface="StarSymbol"/>
-              <a:buChar char=""/>
-            </a:pPr>
-            <a:r>
-              <a:rPr lang="en-US"/>
-              <a:t>Seventh Outline Level</a:t>
-            </a:r>
-            <a:endParaRPr/>
-          </a:p>
-        </p:txBody>
-      </p:sp>
-    </p:spTree>
-  </p:cSld>
-  <p:clrMap accent1="accent1" accent2="accent2" accent3="accent3" accent4="accent4" accent5="accent5" accent6="accent6" bg1="lt1" bg2="lt2" folHlink="folHlink" hlink="hlink" tx1="dk1" tx2="dk2"/>
-  <p:sldLayoutIdLst>
-    <p:sldLayoutId id="2147483649" r:id="rId2"/>
-    <p:sldLayoutId id="2147483650" r:id="rId3"/>
-    <p:sldLayoutId id="2147483651" r:id="rId4"/>
-    <p:sldLayoutId id="2147483652" r:id="rId5"/>
-    <p:sldLayoutId id="2147483653" r:id="rId6"/>
-    <p:sldLayoutId id="2147483654" r:id="rId7"/>
-    <p:sldLayoutId id="2147483655" r:id="rId8"/>
-    <p:sldLayoutId id="2147483656" r:id="rId9"/>
-    <p:sldLayoutId id="2147483657" r:id="rId10"/>
-    <p:sldLayoutId id="2147483658" r:id="rId11"/>
-    <p:sldLayoutId id="2147483659" r:id="rId12"/>
-    <p:sldLayoutId id="2147483660" r:id="rId13"/>
-  </p:sldLayoutIdLst>
-</p:sldMaster>
-</file>
-
-<file path=ppt/slides/slide1.xml><?xml version="1.0" encoding="utf-8"?>
-<p:sld xmlns:a="http://schemas.openxmlformats.org/drawingml/2006/main" xmlns:p="http://schemas.openxmlformats.org/presentationml/2006/main" xmlns:r="http://schemas.openxmlformats.org/officeDocument/2006/relationships">
-  <p:cSld>
-    <p:spTree>
-      <p:nvGrpSpPr>
-        <p:cNvPr id="1" name=""/>
-        <p:cNvGrpSpPr/>
-        <p:nvPr/>
-      </p:nvGrpSpPr>
-      <p:grpSpPr>
-        <a:xfrm>
-          <a:off x="0" y="0"/>
-          <a:ext cx="0" cy="0"/>
-          <a:chOff x="0" y="0"/>
-          <a:chExt cx="0" cy="0"/>
-        </a:xfrm>
-      </p:grpSpPr>
-      <p:sp>
-        <p:nvSpPr>
           <p:cNvPr id="34" name="CustomShape 1"/>
           <p:cNvSpPr/>
           <p:nvPr/>
@@ -1327,17 +1502,18 @@
             <a:avLst/>
           </a:prstGeom>
           <a:solidFill>
-            <a:srgbClr val="cfe7f5"/>
+            <a:srgbClr val="CFE7F5"/>
           </a:solidFill>
           <a:ln>
             <a:solidFill>
               <a:srgbClr val="808080"/>
             </a:solidFill>
-            <a:tailEnd len="med" type="triangle" w="med"/>
+            <a:tailEnd type="triangle" w="med" len="med"/>
           </a:ln>
         </p:spPr>
         <p:txBody>
-          <a:bodyPr anchor="ctr" bIns="45000" lIns="90000" rIns="90000" tIns="45000" wrap="none"/>
+          <a:bodyPr wrap="none" lIns="90000" tIns="45000" rIns="90000" bIns="45000" anchor="ctr"/>
+          <a:lstStyle/>
           <a:p>
             <a:pPr>
               <a:lnSpc>
@@ -1359,9 +1535,9 @@
           <p:nvPr/>
         </p:nvSpPr>
         <p:spPr>
-          <a:xfrm>
-            <a:off x="4023360" y="1280160"/>
-            <a:ext cx="2011680" cy="0"/>
+          <a:xfrm flipV="1">
+            <a:off x="4023359" y="1188720"/>
+            <a:ext cx="2551149" cy="91440"/>
           </a:xfrm>
           <a:prstGeom prst="line">
             <a:avLst/>
@@ -1370,7 +1546,7 @@
             <a:solidFill>
               <a:srgbClr val="000000"/>
             </a:solidFill>
-            <a:tailEnd len="med" type="triangle" w="med"/>
+            <a:tailEnd type="triangle" w="med" len="med"/>
           </a:ln>
         </p:spPr>
       </p:sp>
@@ -1392,7 +1568,7 @@
             <a:solidFill>
               <a:srgbClr val="000000"/>
             </a:solidFill>
-            <a:tailEnd len="med" type="triangle" w="med"/>
+            <a:tailEnd type="triangle" w="med" len="med"/>
           </a:ln>
         </p:spPr>
       </p:sp>
@@ -1414,7 +1590,7 @@
             <a:solidFill>
               <a:srgbClr val="000000"/>
             </a:solidFill>
-            <a:tailEnd len="med" type="triangle" w="med"/>
+            <a:tailEnd type="triangle" w="med" len="med"/>
           </a:ln>
         </p:spPr>
       </p:sp>
@@ -1436,7 +1612,7 @@
             <a:solidFill>
               <a:srgbClr val="000000"/>
             </a:solidFill>
-            <a:tailEnd len="med" type="triangle" w="med"/>
+            <a:tailEnd type="triangle" w="med" len="med"/>
           </a:ln>
         </p:spPr>
       </p:sp>
@@ -1449,7 +1625,7 @@
         <p:spPr>
           <a:xfrm flipH="1">
             <a:off x="5760720" y="4480560"/>
-            <a:ext cx="835560" cy="731520"/>
+            <a:ext cx="914040" cy="731520"/>
           </a:xfrm>
           <a:prstGeom prst="line">
             <a:avLst/>
@@ -1458,7 +1634,7 @@
             <a:solidFill>
               <a:srgbClr val="000000"/>
             </a:solidFill>
-            <a:tailEnd len="med" type="triangle" w="med"/>
+            <a:tailEnd type="triangle" w="med" len="med"/>
           </a:ln>
         </p:spPr>
       </p:sp>
@@ -1477,7 +1653,7 @@
             <a:avLst/>
           </a:prstGeom>
           <a:solidFill>
-            <a:srgbClr val="cfe7f5"/>
+            <a:srgbClr val="CFE7F5"/>
           </a:solidFill>
           <a:ln>
             <a:solidFill>
@@ -1486,7 +1662,8 @@
           </a:ln>
         </p:spPr>
         <p:txBody>
-          <a:bodyPr anchor="ctr" bIns="45000" lIns="90000" rIns="90000" tIns="45000" wrap="none"/>
+          <a:bodyPr wrap="none" lIns="90000" tIns="45000" rIns="90000" bIns="45000" anchor="ctr"/>
+          <a:lstStyle/>
           <a:p>
             <a:r>
               <a:rPr lang="en-US"/>
@@ -1511,7 +1688,7 @@
             <a:avLst/>
           </a:prstGeom>
           <a:solidFill>
-            <a:srgbClr val="cfe7f5"/>
+            <a:srgbClr val="CFE7F5"/>
           </a:solidFill>
           <a:ln>
             <a:solidFill>
@@ -1528,24 +1705,25 @@
         </p:nvSpPr>
         <p:spPr>
           <a:xfrm>
-            <a:off x="5943600" y="366120"/>
+            <a:off x="6574869" y="360"/>
             <a:ext cx="2559960" cy="456840"/>
           </a:xfrm>
           <a:prstGeom prst="rect">
             <a:avLst/>
           </a:prstGeom>
           <a:solidFill>
-            <a:srgbClr val="cfe7f5"/>
+            <a:srgbClr val="CFE7F5"/>
           </a:solidFill>
           <a:ln>
             <a:solidFill>
               <a:srgbClr val="808080"/>
             </a:solidFill>
-            <a:tailEnd len="med" type="triangle" w="med"/>
+            <a:tailEnd type="triangle" w="med" len="med"/>
           </a:ln>
         </p:spPr>
         <p:txBody>
-          <a:bodyPr anchor="ctr" bIns="45000" lIns="90000" rIns="90000" tIns="45000" wrap="none"/>
+          <a:bodyPr wrap="none" lIns="90000" tIns="45000" rIns="90000" bIns="45000" anchor="ctr"/>
+          <a:lstStyle/>
           <a:p>
             <a:pPr>
               <a:lnSpc>
@@ -1568,14 +1746,14 @@
         </p:nvSpPr>
         <p:spPr>
           <a:xfrm>
-            <a:off x="5943240" y="1554480"/>
-            <a:ext cx="2560320" cy="1463040"/>
+            <a:off x="6574509" y="1188719"/>
+            <a:ext cx="2560320" cy="1905318"/>
           </a:xfrm>
           <a:prstGeom prst="rect">
             <a:avLst/>
           </a:prstGeom>
           <a:solidFill>
-            <a:srgbClr val="cfe7f5"/>
+            <a:srgbClr val="CFE7F5"/>
           </a:solidFill>
           <a:ln>
             <a:solidFill>
@@ -1584,41 +1762,79 @@
           </a:ln>
         </p:spPr>
         <p:txBody>
-          <a:bodyPr anchor="ctr" bIns="45000" lIns="90000" rIns="90000" tIns="45000" wrap="none"/>
-          <a:p>
-            <a:r>
-              <a:rPr lang="en-US"/>
+          <a:bodyPr wrap="none" lIns="90000" tIns="45000" rIns="90000" bIns="45000" anchor="ctr"/>
+          <a:lstStyle/>
+          <a:p>
+            <a:r>
+              <a:rPr lang="en-US" sz="1050" dirty="0" err="1"/>
               <a:t>PluginCore</a:t>
             </a:r>
-            <a:endParaRPr/>
-          </a:p>
-          <a:p>
-            <a:r>
-              <a:rPr lang="en-US"/>
+            <a:endParaRPr sz="1050" dirty="0"/>
+          </a:p>
+          <a:p>
+            <a:r>
+              <a:rPr lang="en-US" sz="1050" dirty="0"/>
               <a:t>Start</a:t>
             </a:r>
-            <a:endParaRPr/>
-          </a:p>
-          <a:p>
-            <a:r>
-              <a:rPr lang="en-US"/>
+            <a:endParaRPr sz="1050" dirty="0"/>
+          </a:p>
+          <a:p>
+            <a:r>
+              <a:rPr lang="en-US" sz="1050" dirty="0"/>
               <a:t>Stop</a:t>
             </a:r>
-            <a:endParaRPr/>
-          </a:p>
-          <a:p>
-            <a:r>
-              <a:rPr lang="en-US"/>
+            <a:endParaRPr sz="1050" dirty="0"/>
+          </a:p>
+          <a:p>
+            <a:r>
+              <a:rPr lang="en-US" sz="1050" dirty="0" err="1"/>
               <a:t>AddPlugin</a:t>
             </a:r>
-            <a:endParaRPr/>
-          </a:p>
-          <a:p>
-            <a:r>
-              <a:rPr lang="en-US"/>
-              <a:t>Remove Plugin</a:t>
-            </a:r>
-            <a:endParaRPr/>
+            <a:endParaRPr sz="1050" dirty="0"/>
+          </a:p>
+          <a:p>
+            <a:r>
+              <a:rPr lang="en-US" sz="1050" dirty="0"/>
+              <a:t>Remove </a:t>
+            </a:r>
+            <a:r>
+              <a:rPr lang="en-US" sz="1050" dirty="0" smtClean="0"/>
+              <a:t>Plugin</a:t>
+            </a:r>
+          </a:p>
+          <a:p>
+            <a:r>
+              <a:rPr lang="en-US" sz="1050" dirty="0" err="1" smtClean="0"/>
+              <a:t>addAddListener</a:t>
+            </a:r>
+            <a:endParaRPr lang="en-US" sz="1050" dirty="0" smtClean="0"/>
+          </a:p>
+          <a:p>
+            <a:r>
+              <a:rPr lang="en-US" sz="1050" dirty="0" err="1" smtClean="0"/>
+              <a:t>addRemoveListener</a:t>
+            </a:r>
+            <a:endParaRPr lang="en-US" sz="1050" dirty="0" smtClean="0"/>
+          </a:p>
+          <a:p>
+            <a:r>
+              <a:rPr lang="en-US" sz="1050" dirty="0" err="1" smtClean="0"/>
+              <a:t>getAddButton</a:t>
+            </a:r>
+            <a:endParaRPr lang="en-US" sz="1050" dirty="0" smtClean="0"/>
+          </a:p>
+          <a:p>
+            <a:r>
+              <a:rPr lang="en-US" sz="1050" dirty="0" err="1" smtClean="0"/>
+              <a:t>getRemoveButton</a:t>
+            </a:r>
+            <a:endParaRPr lang="en-US" sz="1050" dirty="0" smtClean="0"/>
+          </a:p>
+          <a:p>
+            <a:endParaRPr lang="en-US" sz="1050" dirty="0" smtClean="0"/>
+          </a:p>
+          <a:p>
+            <a:endParaRPr sz="1400" dirty="0"/>
           </a:p>
         </p:txBody>
       </p:sp>
@@ -1630,14 +1846,14 @@
         </p:nvSpPr>
         <p:spPr>
           <a:xfrm>
-            <a:off x="5943240" y="822960"/>
+            <a:off x="6574509" y="457200"/>
             <a:ext cx="2560320" cy="731520"/>
           </a:xfrm>
           <a:prstGeom prst="rect">
             <a:avLst/>
           </a:prstGeom>
           <a:solidFill>
-            <a:srgbClr val="cfe7f5"/>
+            <a:srgbClr val="CFE7F5"/>
           </a:solidFill>
           <a:ln>
             <a:solidFill>
@@ -1646,32 +1862,13 @@
           </a:ln>
         </p:spPr>
         <p:txBody>
-          <a:bodyPr anchor="ctr" bIns="45000" lIns="90000" rIns="90000" tIns="45000" wrap="none"/>
-          <a:p>
-            <a:r>
-              <a:rPr lang="en-US" sz="1200">
-                <a:solidFill>
-                  <a:srgbClr val="000000"/>
-                </a:solidFill>
-                <a:latin typeface="Arial"/>
-                <a:ea typeface="Consolas"/>
-              </a:rPr>
-              <a:t>PluginManager </a:t>
-            </a:r>
-            <a:r>
-              <a:rPr lang="en-US" sz="1200">
-                <a:solidFill>
-                  <a:srgbClr val="0000c0"/>
-                </a:solidFill>
-                <a:latin typeface="Arial"/>
-                <a:ea typeface="Consolas"/>
-              </a:rPr>
-              <a:t>pluginManager</a:t>
-            </a:r>
-            <a:endParaRPr/>
-          </a:p>
-          <a:p>
-            <a:endParaRPr/>
+          <a:bodyPr wrap="none" lIns="90000" tIns="45000" rIns="90000" bIns="45000" anchor="ctr"/>
+          <a:lstStyle/>
+          <a:p>
+            <a:endParaRPr dirty="0"/>
+          </a:p>
+          <a:p>
+            <a:endParaRPr dirty="0"/>
           </a:p>
         </p:txBody>
       </p:sp>
@@ -1690,17 +1887,18 @@
             <a:avLst/>
           </a:prstGeom>
           <a:solidFill>
-            <a:srgbClr val="cfe7f5"/>
+            <a:srgbClr val="CFE7F5"/>
           </a:solidFill>
           <a:ln>
             <a:solidFill>
               <a:srgbClr val="808080"/>
             </a:solidFill>
-            <a:tailEnd len="med" type="triangle" w="med"/>
+            <a:tailEnd type="triangle" w="med" len="med"/>
           </a:ln>
         </p:spPr>
         <p:txBody>
-          <a:bodyPr anchor="ctr" bIns="45000" lIns="90000" rIns="90000" tIns="45000" wrap="none"/>
+          <a:bodyPr wrap="none" lIns="90000" tIns="45000" rIns="90000" bIns="45000" anchor="ctr"/>
+          <a:lstStyle/>
           <a:p>
             <a:pPr>
               <a:lnSpc>
@@ -1730,7 +1928,7 @@
             <a:avLst/>
           </a:prstGeom>
           <a:solidFill>
-            <a:srgbClr val="cfe7f5"/>
+            <a:srgbClr val="CFE7F5"/>
           </a:solidFill>
           <a:ln>
             <a:solidFill>
@@ -1739,7 +1937,8 @@
           </a:ln>
         </p:spPr>
         <p:txBody>
-          <a:bodyPr anchor="ctr" bIns="45000" lIns="90000" rIns="90000" tIns="45000" wrap="none"/>
+          <a:bodyPr wrap="none" lIns="90000" tIns="45000" rIns="90000" bIns="45000" anchor="ctr"/>
+          <a:lstStyle/>
           <a:p>
             <a:r>
               <a:rPr lang="en-US"/>
@@ -1799,7 +1998,7 @@
             <a:avLst/>
           </a:prstGeom>
           <a:solidFill>
-            <a:srgbClr val="cfe7f5"/>
+            <a:srgbClr val="CFE7F5"/>
           </a:solidFill>
           <a:ln>
             <a:solidFill>
@@ -1823,17 +2022,18 @@
             <a:avLst/>
           </a:prstGeom>
           <a:solidFill>
-            <a:srgbClr val="cfe7f5"/>
+            <a:srgbClr val="CFE7F5"/>
           </a:solidFill>
           <a:ln>
             <a:solidFill>
               <a:srgbClr val="808080"/>
             </a:solidFill>
-            <a:tailEnd len="med" type="triangle" w="med"/>
+            <a:tailEnd type="triangle" w="med" len="med"/>
           </a:ln>
         </p:spPr>
         <p:txBody>
-          <a:bodyPr anchor="ctr" bIns="45000" lIns="90000" rIns="90000" tIns="45000" wrap="none"/>
+          <a:bodyPr wrap="none" lIns="90000" tIns="45000" rIns="90000" bIns="45000" anchor="ctr"/>
+          <a:lstStyle/>
           <a:p>
             <a:pPr>
               <a:lnSpc>
@@ -1863,7 +2063,7 @@
             <a:avLst/>
           </a:prstGeom>
           <a:solidFill>
-            <a:srgbClr val="cfe7f5"/>
+            <a:srgbClr val="CFE7F5"/>
           </a:solidFill>
           <a:ln>
             <a:solidFill>
@@ -1872,34 +2072,49 @@
           </a:ln>
         </p:spPr>
         <p:txBody>
-          <a:bodyPr anchor="ctr" bIns="45000" lIns="90000" rIns="90000" tIns="45000" wrap="none"/>
-          <a:p>
-            <a:r>
-              <a:rPr lang="en-US"/>
+          <a:bodyPr wrap="none" lIns="90000" tIns="45000" rIns="90000" bIns="45000" anchor="ctr"/>
+          <a:lstStyle/>
+          <a:p>
+            <a:r>
+              <a:rPr lang="en-US" sz="1200" dirty="0" err="1"/>
               <a:t>PluginManger</a:t>
             </a:r>
-            <a:endParaRPr/>
-          </a:p>
-          <a:p>
-            <a:r>
-              <a:rPr lang="en-US"/>
+            <a:endParaRPr sz="1200" dirty="0"/>
+          </a:p>
+          <a:p>
+            <a:r>
+              <a:rPr lang="en-US" sz="1200" dirty="0"/>
               <a:t>Run</a:t>
             </a:r>
-            <a:endParaRPr/>
-          </a:p>
-          <a:p>
-            <a:r>
-              <a:rPr lang="en-US"/>
+            <a:endParaRPr sz="1200" dirty="0"/>
+          </a:p>
+          <a:p>
+            <a:r>
+              <a:rPr lang="en-US" sz="1200" dirty="0" err="1"/>
               <a:t>LoadBundel</a:t>
             </a:r>
-            <a:endParaRPr/>
-          </a:p>
-          <a:p>
-            <a:r>
-              <a:rPr lang="en-US"/>
+            <a:endParaRPr sz="1200" dirty="0"/>
+          </a:p>
+          <a:p>
+            <a:r>
+              <a:rPr lang="en-US" sz="1200" dirty="0" err="1" smtClean="0"/>
               <a:t>UnloadBundel</a:t>
             </a:r>
-            <a:endParaRPr/>
+            <a:endParaRPr lang="en-US" sz="1200" dirty="0" smtClean="0"/>
+          </a:p>
+          <a:p>
+            <a:r>
+              <a:rPr lang="en-US" sz="1200" dirty="0" err="1" smtClean="0"/>
+              <a:t>AddListener</a:t>
+            </a:r>
+            <a:endParaRPr lang="en-US" sz="1200" dirty="0" smtClean="0"/>
+          </a:p>
+          <a:p>
+            <a:r>
+              <a:rPr lang="en-US" sz="1200" dirty="0" err="1" smtClean="0"/>
+              <a:t>RemoveListener</a:t>
+            </a:r>
+            <a:endParaRPr sz="1200" dirty="0"/>
           </a:p>
         </p:txBody>
       </p:sp>
@@ -1918,7 +2133,7 @@
             <a:avLst/>
           </a:prstGeom>
           <a:solidFill>
-            <a:srgbClr val="cfe7f5"/>
+            <a:srgbClr val="CFE7F5"/>
           </a:solidFill>
           <a:ln>
             <a:solidFill>
@@ -1942,17 +2157,18 @@
             <a:avLst/>
           </a:prstGeom>
           <a:solidFill>
-            <a:srgbClr val="cfe7f5"/>
+            <a:srgbClr val="CFE7F5"/>
           </a:solidFill>
           <a:ln>
             <a:solidFill>
               <a:srgbClr val="808080"/>
             </a:solidFill>
-            <a:tailEnd len="med" type="triangle" w="med"/>
+            <a:tailEnd type="triangle" w="med" len="med"/>
           </a:ln>
         </p:spPr>
         <p:txBody>
-          <a:bodyPr anchor="ctr" bIns="45000" lIns="90000" rIns="90000" tIns="45000" wrap="none"/>
+          <a:bodyPr wrap="none" lIns="90000" tIns="45000" rIns="90000" bIns="45000" anchor="ctr"/>
+          <a:lstStyle/>
           <a:p>
             <a:pPr>
               <a:lnSpc>
@@ -1982,7 +2198,7 @@
             <a:avLst/>
           </a:prstGeom>
           <a:solidFill>
-            <a:srgbClr val="cfe7f5"/>
+            <a:srgbClr val="CFE7F5"/>
           </a:solidFill>
           <a:ln>
             <a:solidFill>
@@ -1991,48 +2207,42 @@
           </a:ln>
         </p:spPr>
         <p:txBody>
-          <a:bodyPr anchor="ctr" bIns="45000" lIns="90000" rIns="90000" tIns="45000" wrap="none"/>
-          <a:p>
-            <a:r>
-              <a:rPr lang="en-US"/>
+          <a:bodyPr wrap="none" lIns="90000" tIns="45000" rIns="90000" bIns="45000" anchor="ctr"/>
+          <a:lstStyle/>
+          <a:p>
+            <a:r>
+              <a:rPr lang="en-US" dirty="0"/>
               <a:t>Register</a:t>
             </a:r>
-            <a:endParaRPr/>
-          </a:p>
-          <a:p>
-            <a:r>
-              <a:rPr lang="en-US"/>
+            <a:endParaRPr dirty="0"/>
+          </a:p>
+          <a:p>
+            <a:r>
+              <a:rPr lang="en-US" dirty="0" err="1"/>
               <a:t>RegisterAll</a:t>
             </a:r>
-            <a:endParaRPr/>
-          </a:p>
-          <a:p>
-            <a:r>
-              <a:rPr lang="en-US"/>
+            <a:endParaRPr dirty="0"/>
+          </a:p>
+          <a:p>
+            <a:r>
+              <a:rPr lang="en-US" dirty="0" err="1"/>
               <a:t>WathcDir</a:t>
             </a:r>
-            <a:endParaRPr/>
-          </a:p>
-          <a:p>
-            <a:r>
-              <a:rPr lang="en-US"/>
+            <a:endParaRPr dirty="0"/>
+          </a:p>
+          <a:p>
+            <a:r>
+              <a:rPr lang="en-US" dirty="0" err="1"/>
               <a:t>ProcessEvents</a:t>
             </a:r>
-            <a:endParaRPr/>
-          </a:p>
-          <a:p>
-            <a:r>
-              <a:rPr lang="en-US"/>
+            <a:endParaRPr dirty="0"/>
+          </a:p>
+          <a:p>
+            <a:r>
+              <a:rPr lang="en-US" smtClean="0"/>
               <a:t>Usage</a:t>
             </a:r>
-            <a:endParaRPr/>
-          </a:p>
-          <a:p>
-            <a:r>
-              <a:rPr lang="en-US"/>
-              <a:t>Main()</a:t>
-            </a:r>
-            <a:endParaRPr/>
+            <a:endParaRPr dirty="0"/>
           </a:p>
         </p:txBody>
       </p:sp>
@@ -2051,7 +2261,7 @@
             <a:avLst/>
           </a:prstGeom>
           <a:solidFill>
-            <a:srgbClr val="cfe7f5"/>
+            <a:srgbClr val="CFE7F5"/>
           </a:solidFill>
           <a:ln>
             <a:solidFill>
@@ -2060,26 +2270,67 @@
           </a:ln>
         </p:spPr>
       </p:sp>
+      <p:sp>
+        <p:nvSpPr>
+          <p:cNvPr id="2" name="TextBox 1"/>
+          <p:cNvSpPr txBox="1"/>
+          <p:nvPr/>
+        </p:nvSpPr>
+        <p:spPr>
+          <a:xfrm>
+            <a:off x="6674760" y="3840480"/>
+            <a:ext cx="2560320" cy="369332"/>
+          </a:xfrm>
+          <a:prstGeom prst="rect">
+            <a:avLst/>
+          </a:prstGeom>
+          <a:noFill/>
+        </p:spPr>
+        <p:txBody>
+          <a:bodyPr wrap="square" rtlCol="0">
+            <a:spAutoFit/>
+          </a:bodyPr>
+          <a:lstStyle/>
+          <a:p>
+            <a:r>
+              <a:rPr lang="en-US" dirty="0" err="1" smtClean="0"/>
+              <a:t>PluginCore</a:t>
+            </a:r>
+            <a:r>
+              <a:rPr lang="en-US" dirty="0" smtClean="0"/>
+              <a:t> core </a:t>
+            </a:r>
+            <a:endParaRPr lang="en-US" dirty="0"/>
+          </a:p>
+        </p:txBody>
+      </p:sp>
     </p:spTree>
   </p:cSld>
+  <p:clrMapOvr>
+    <a:masterClrMapping/>
+  </p:clrMapOvr>
   <p:timing>
     <p:tnLst>
       <p:par>
-        <p:cTn dur="indefinite" id="1" nodeType="tmRoot" restart="never">
+        <p:cTn id="1" dur="indefinite" restart="never" nodeType="tmRoot">
           <p:childTnLst>
             <p:seq>
               <p:cTn id="2" nodeType="mainSeq">
-                <p:childTnLst/>
+                <p:childTnLst>
+                  <p:par>
+                    <p:cTn id="3"/>
+                  </p:par>
+                </p:childTnLst>
               </p:cTn>
               <p:prevCondLst>
-                <p:cond delay="0" evt="onPrev">
+                <p:cond evt="onPrev" delay="0">
                   <p:tgtEl>
                     <p:sldTgt/>
                   </p:tgtEl>
                 </p:cond>
               </p:prevCondLst>
               <p:nextCondLst>
-                <p:cond delay="0" evt="onNext">
+                <p:cond evt="onNext" delay="0">
                   <p:tgtEl>
                     <p:sldTgt/>
                   </p:tgtEl>
@@ -2314,5 +2565,7 @@
       </a:bgFillStyleLst>
     </a:fmtScheme>
   </a:themeElements>
+  <a:objectDefaults/>
+  <a:extraClrSchemeLst/>
 </a:theme>
 </file>
</xml_diff>